<commit_message>
I promise. This is the last update
</commit_message>
<xml_diff>
--- a/Stop everything! Top T-SQL tricks to a developer.pptx
+++ b/Stop everything! Top T-SQL tricks to a developer.pptx
@@ -6,7 +6,7 @@
     <p:sldMasterId id="2147483787" r:id="rId2"/>
   </p:sldMasterIdLst>
   <p:notesMasterIdLst>
-    <p:notesMasterId r:id="rId27"/>
+    <p:notesMasterId r:id="rId28"/>
   </p:notesMasterIdLst>
   <p:sldIdLst>
     <p:sldId id="351" r:id="rId3"/>
@@ -16,23 +16,24 @@
     <p:sldId id="359" r:id="rId7"/>
     <p:sldId id="314" r:id="rId8"/>
     <p:sldId id="306" r:id="rId9"/>
-    <p:sldId id="355" r:id="rId10"/>
-    <p:sldId id="361" r:id="rId11"/>
-    <p:sldId id="362" r:id="rId12"/>
-    <p:sldId id="358" r:id="rId13"/>
-    <p:sldId id="372" r:id="rId14"/>
-    <p:sldId id="357" r:id="rId15"/>
-    <p:sldId id="360" r:id="rId16"/>
-    <p:sldId id="364" r:id="rId17"/>
-    <p:sldId id="363" r:id="rId18"/>
-    <p:sldId id="365" r:id="rId19"/>
-    <p:sldId id="366" r:id="rId20"/>
-    <p:sldId id="367" r:id="rId21"/>
-    <p:sldId id="373" r:id="rId22"/>
-    <p:sldId id="371" r:id="rId23"/>
-    <p:sldId id="374" r:id="rId24"/>
-    <p:sldId id="370" r:id="rId25"/>
-    <p:sldId id="369" r:id="rId26"/>
+    <p:sldId id="375" r:id="rId10"/>
+    <p:sldId id="355" r:id="rId11"/>
+    <p:sldId id="361" r:id="rId12"/>
+    <p:sldId id="362" r:id="rId13"/>
+    <p:sldId id="358" r:id="rId14"/>
+    <p:sldId id="372" r:id="rId15"/>
+    <p:sldId id="357" r:id="rId16"/>
+    <p:sldId id="360" r:id="rId17"/>
+    <p:sldId id="364" r:id="rId18"/>
+    <p:sldId id="363" r:id="rId19"/>
+    <p:sldId id="365" r:id="rId20"/>
+    <p:sldId id="366" r:id="rId21"/>
+    <p:sldId id="367" r:id="rId22"/>
+    <p:sldId id="373" r:id="rId23"/>
+    <p:sldId id="371" r:id="rId24"/>
+    <p:sldId id="374" r:id="rId25"/>
+    <p:sldId id="370" r:id="rId26"/>
+    <p:sldId id="369" r:id="rId27"/>
   </p:sldIdLst>
   <p:sldSz cx="12192000" cy="6858000"/>
   <p:notesSz cx="6858000" cy="9144000"/>
@@ -4941,7 +4942,7 @@
           <a:graphicData uri="http://schemas.openxmlformats.org/presentationml/2006/ole">
             <mc:AlternateContent xmlns:mc="http://schemas.openxmlformats.org/markup-compatibility/2006">
               <mc:Choice xmlns:v="urn:schemas-microsoft-com:vml" Requires="v">
-                <p:oleObj spid="_x0000_s4192" name="Image" r:id="rId13" imgW="2279520" imgH="1310400" progId="Photoshop.Image.18">
+                <p:oleObj spid="_x0000_s4196" name="Image" r:id="rId13" imgW="2279520" imgH="1310400" progId="Photoshop.Image.18">
                   <p:embed/>
                 </p:oleObj>
               </mc:Choice>
@@ -5330,7 +5331,7 @@
         <p:spPr>
           <a:xfrm>
             <a:off x="380885" y="4000221"/>
-            <a:ext cx="11429747" cy="1248787"/>
+            <a:ext cx="11429747" cy="1766097"/>
           </a:xfrm>
         </p:spPr>
         <p:txBody>
@@ -5341,6 +5342,9 @@
               <a:rPr lang="en-US" sz="4000" dirty="0"/>
               <a:t>Stop everything! Top T-SQL tricks to a developer</a:t>
             </a:r>
+            <a:br>
+              <a:rPr lang="en-US" sz="4000" dirty="0"/>
+            </a:br>
             <a:br>
               <a:rPr lang="en-US" sz="4000" dirty="0"/>
             </a:br>
@@ -5398,6 +5402,83 @@
 </file>
 
 <file path=ppt/slides/slide10.xml><?xml version="1.0" encoding="utf-8"?>
+<p:sld xmlns:a="http://schemas.openxmlformats.org/drawingml/2006/main" xmlns:r="http://schemas.openxmlformats.org/officeDocument/2006/relationships" xmlns:p="http://schemas.openxmlformats.org/presentationml/2006/main">
+  <p:cSld>
+    <p:spTree>
+      <p:nvGrpSpPr>
+        <p:cNvPr id="1" name=""/>
+        <p:cNvGrpSpPr/>
+        <p:nvPr/>
+      </p:nvGrpSpPr>
+      <p:grpSpPr>
+        <a:xfrm>
+          <a:off x="0" y="0"/>
+          <a:ext cx="0" cy="0"/>
+          <a:chOff x="0" y="0"/>
+          <a:chExt cx="0" cy="0"/>
+        </a:xfrm>
+      </p:grpSpPr>
+      <p:sp>
+        <p:nvSpPr>
+          <p:cNvPr id="4" name="Title 3"/>
+          <p:cNvSpPr>
+            <a:spLocks noGrp="1"/>
+          </p:cNvSpPr>
+          <p:nvPr>
+            <p:ph type="title"/>
+          </p:nvPr>
+        </p:nvSpPr>
+        <p:spPr/>
+        <p:txBody>
+          <a:bodyPr>
+            <a:normAutofit/>
+          </a:bodyPr>
+          <a:lstStyle/>
+          <a:p>
+            <a:r>
+              <a:rPr lang="en-GB" dirty="0">
+                <a:solidFill>
+                  <a:schemeClr val="accent1"/>
+                </a:solidFill>
+              </a:rPr>
+              <a:t>Demo</a:t>
+            </a:r>
+          </a:p>
+        </p:txBody>
+      </p:sp>
+      <p:sp>
+        <p:nvSpPr>
+          <p:cNvPr id="2" name="Text Placeholder 1"/>
+          <p:cNvSpPr>
+            <a:spLocks noGrp="1"/>
+          </p:cNvSpPr>
+          <p:nvPr>
+            <p:ph type="body" idx="1"/>
+          </p:nvPr>
+        </p:nvSpPr>
+        <p:spPr/>
+        <p:txBody>
+          <a:bodyPr/>
+          <a:lstStyle/>
+          <a:p>
+            <a:endParaRPr lang="en-GB" dirty="0"/>
+          </a:p>
+        </p:txBody>
+      </p:sp>
+    </p:spTree>
+    <p:extLst>
+      <p:ext uri="{BB962C8B-B14F-4D97-AF65-F5344CB8AC3E}">
+        <p14:creationId xmlns:p14="http://schemas.microsoft.com/office/powerpoint/2010/main" val="1872281719"/>
+      </p:ext>
+    </p:extLst>
+  </p:cSld>
+  <p:clrMapOvr>
+    <a:masterClrMapping/>
+  </p:clrMapOvr>
+</p:sld>
+</file>
+
+<file path=ppt/slides/slide11.xml><?xml version="1.0" encoding="utf-8"?>
 <p:sld xmlns:a="http://schemas.openxmlformats.org/drawingml/2006/main" xmlns:r="http://schemas.openxmlformats.org/officeDocument/2006/relationships" xmlns:p="http://schemas.openxmlformats.org/presentationml/2006/main" showMasterSp="0">
   <p:cSld>
     <p:spTree>
@@ -5507,7 +5588,7 @@
 </p:sld>
 </file>
 
-<file path=ppt/slides/slide11.xml><?xml version="1.0" encoding="utf-8"?>
+<file path=ppt/slides/slide12.xml><?xml version="1.0" encoding="utf-8"?>
 <p:sld xmlns:a="http://schemas.openxmlformats.org/drawingml/2006/main" xmlns:r="http://schemas.openxmlformats.org/officeDocument/2006/relationships" xmlns:p="http://schemas.openxmlformats.org/presentationml/2006/main" showMasterSp="0">
   <p:cSld>
     <p:spTree>
@@ -6163,7 +6244,7 @@
 </p:sld>
 </file>
 
-<file path=ppt/slides/slide12.xml><?xml version="1.0" encoding="utf-8"?>
+<file path=ppt/slides/slide13.xml><?xml version="1.0" encoding="utf-8"?>
 <p:sld xmlns:a="http://schemas.openxmlformats.org/drawingml/2006/main" xmlns:r="http://schemas.openxmlformats.org/officeDocument/2006/relationships" xmlns:p="http://schemas.openxmlformats.org/presentationml/2006/main" showMasterSp="0">
   <p:cSld>
     <p:spTree>
@@ -6628,7 +6709,7 @@
 </p:sld>
 </file>
 
-<file path=ppt/slides/slide13.xml><?xml version="1.0" encoding="utf-8"?>
+<file path=ppt/slides/slide14.xml><?xml version="1.0" encoding="utf-8"?>
 <p:sld xmlns:a="http://schemas.openxmlformats.org/drawingml/2006/main" xmlns:r="http://schemas.openxmlformats.org/officeDocument/2006/relationships" xmlns:p="http://schemas.openxmlformats.org/presentationml/2006/main">
   <p:cSld>
     <p:spTree>
@@ -6705,7 +6786,7 @@
 </p:sld>
 </file>
 
-<file path=ppt/slides/slide14.xml><?xml version="1.0" encoding="utf-8"?>
+<file path=ppt/slides/slide15.xml><?xml version="1.0" encoding="utf-8"?>
 <p:sld xmlns:a="http://schemas.openxmlformats.org/drawingml/2006/main" xmlns:r="http://schemas.openxmlformats.org/officeDocument/2006/relationships" xmlns:p="http://schemas.openxmlformats.org/presentationml/2006/main" showMasterSp="0">
   <p:cSld>
     <p:spTree>
@@ -7166,7 +7247,7 @@
 </p:sld>
 </file>
 
-<file path=ppt/slides/slide15.xml><?xml version="1.0" encoding="utf-8"?>
+<file path=ppt/slides/slide16.xml><?xml version="1.0" encoding="utf-8"?>
 <p:sld xmlns:a="http://schemas.openxmlformats.org/drawingml/2006/main" xmlns:r="http://schemas.openxmlformats.org/officeDocument/2006/relationships" xmlns:p="http://schemas.openxmlformats.org/presentationml/2006/main">
   <p:cSld>
     <p:spTree>
@@ -7243,7 +7324,7 @@
 </p:sld>
 </file>
 
-<file path=ppt/slides/slide16.xml><?xml version="1.0" encoding="utf-8"?>
+<file path=ppt/slides/slide17.xml><?xml version="1.0" encoding="utf-8"?>
 <p:sld xmlns:a="http://schemas.openxmlformats.org/drawingml/2006/main" xmlns:r="http://schemas.openxmlformats.org/officeDocument/2006/relationships" xmlns:p="http://schemas.openxmlformats.org/presentationml/2006/main" showMasterSp="0">
   <p:cSld>
     <p:spTree>
@@ -7373,469 +7454,6 @@
     <p:extLst>
       <p:ext uri="{BB962C8B-B14F-4D97-AF65-F5344CB8AC3E}">
         <p14:creationId xmlns:p14="http://schemas.microsoft.com/office/powerpoint/2010/main" val="582768855"/>
-      </p:ext>
-    </p:extLst>
-  </p:cSld>
-  <p:clrMapOvr>
-    <a:masterClrMapping/>
-  </p:clrMapOvr>
-  <p:timing>
-    <p:tnLst>
-      <p:par>
-        <p:cTn id="1" dur="indefinite" restart="never" nodeType="tmRoot">
-          <p:childTnLst>
-            <p:seq concurrent="1" nextAc="seek">
-              <p:cTn id="2" dur="indefinite" nodeType="mainSeq">
-                <p:childTnLst>
-                  <p:par>
-                    <p:cTn id="3" fill="hold">
-                      <p:stCondLst>
-                        <p:cond delay="indefinite"/>
-                      </p:stCondLst>
-                      <p:childTnLst>
-                        <p:par>
-                          <p:cTn id="4" fill="hold">
-                            <p:stCondLst>
-                              <p:cond delay="0"/>
-                            </p:stCondLst>
-                            <p:childTnLst>
-                              <p:par>
-                                <p:cTn id="5" presetID="10" presetClass="entr" presetSubtype="0" fill="hold" nodeType="clickEffect">
-                                  <p:stCondLst>
-                                    <p:cond delay="0"/>
-                                  </p:stCondLst>
-                                  <p:childTnLst>
-                                    <p:set>
-                                      <p:cBhvr>
-                                        <p:cTn id="6" dur="1" fill="hold">
-                                          <p:stCondLst>
-                                            <p:cond delay="0"/>
-                                          </p:stCondLst>
-                                        </p:cTn>
-                                        <p:tgtEl>
-                                          <p:spTgt spid="3">
-                                            <p:txEl>
-                                              <p:pRg st="0" end="0"/>
-                                            </p:txEl>
-                                          </p:spTgt>
-                                        </p:tgtEl>
-                                        <p:attrNameLst>
-                                          <p:attrName>style.visibility</p:attrName>
-                                        </p:attrNameLst>
-                                      </p:cBhvr>
-                                      <p:to>
-                                        <p:strVal val="visible"/>
-                                      </p:to>
-                                    </p:set>
-                                    <p:animEffect transition="in" filter="fade">
-                                      <p:cBhvr>
-                                        <p:cTn id="7" dur="500"/>
-                                        <p:tgtEl>
-                                          <p:spTgt spid="3">
-                                            <p:txEl>
-                                              <p:pRg st="0" end="0"/>
-                                            </p:txEl>
-                                          </p:spTgt>
-                                        </p:tgtEl>
-                                      </p:cBhvr>
-                                    </p:animEffect>
-                                  </p:childTnLst>
-                                </p:cTn>
-                              </p:par>
-                            </p:childTnLst>
-                          </p:cTn>
-                        </p:par>
-                      </p:childTnLst>
-                    </p:cTn>
-                  </p:par>
-                  <p:par>
-                    <p:cTn id="8" fill="hold">
-                      <p:stCondLst>
-                        <p:cond delay="indefinite"/>
-                      </p:stCondLst>
-                      <p:childTnLst>
-                        <p:par>
-                          <p:cTn id="9" fill="hold">
-                            <p:stCondLst>
-                              <p:cond delay="0"/>
-                            </p:stCondLst>
-                            <p:childTnLst>
-                              <p:par>
-                                <p:cTn id="10" presetID="10" presetClass="entr" presetSubtype="0" fill="hold" nodeType="clickEffect">
-                                  <p:stCondLst>
-                                    <p:cond delay="0"/>
-                                  </p:stCondLst>
-                                  <p:childTnLst>
-                                    <p:set>
-                                      <p:cBhvr>
-                                        <p:cTn id="11" dur="1" fill="hold">
-                                          <p:stCondLst>
-                                            <p:cond delay="0"/>
-                                          </p:stCondLst>
-                                        </p:cTn>
-                                        <p:tgtEl>
-                                          <p:spTgt spid="3">
-                                            <p:txEl>
-                                              <p:pRg st="1" end="1"/>
-                                            </p:txEl>
-                                          </p:spTgt>
-                                        </p:tgtEl>
-                                        <p:attrNameLst>
-                                          <p:attrName>style.visibility</p:attrName>
-                                        </p:attrNameLst>
-                                      </p:cBhvr>
-                                      <p:to>
-                                        <p:strVal val="visible"/>
-                                      </p:to>
-                                    </p:set>
-                                    <p:animEffect transition="in" filter="fade">
-                                      <p:cBhvr>
-                                        <p:cTn id="12" dur="500"/>
-                                        <p:tgtEl>
-                                          <p:spTgt spid="3">
-                                            <p:txEl>
-                                              <p:pRg st="1" end="1"/>
-                                            </p:txEl>
-                                          </p:spTgt>
-                                        </p:tgtEl>
-                                      </p:cBhvr>
-                                    </p:animEffect>
-                                  </p:childTnLst>
-                                </p:cTn>
-                              </p:par>
-                              <p:par>
-                                <p:cTn id="13" presetID="10" presetClass="entr" presetSubtype="0" fill="hold" nodeType="withEffect">
-                                  <p:stCondLst>
-                                    <p:cond delay="0"/>
-                                  </p:stCondLst>
-                                  <p:childTnLst>
-                                    <p:set>
-                                      <p:cBhvr>
-                                        <p:cTn id="14" dur="1" fill="hold">
-                                          <p:stCondLst>
-                                            <p:cond delay="0"/>
-                                          </p:stCondLst>
-                                        </p:cTn>
-                                        <p:tgtEl>
-                                          <p:spTgt spid="3">
-                                            <p:txEl>
-                                              <p:pRg st="3" end="3"/>
-                                            </p:txEl>
-                                          </p:spTgt>
-                                        </p:tgtEl>
-                                        <p:attrNameLst>
-                                          <p:attrName>style.visibility</p:attrName>
-                                        </p:attrNameLst>
-                                      </p:cBhvr>
-                                      <p:to>
-                                        <p:strVal val="visible"/>
-                                      </p:to>
-                                    </p:set>
-                                    <p:animEffect transition="in" filter="fade">
-                                      <p:cBhvr>
-                                        <p:cTn id="15" dur="500"/>
-                                        <p:tgtEl>
-                                          <p:spTgt spid="3">
-                                            <p:txEl>
-                                              <p:pRg st="3" end="3"/>
-                                            </p:txEl>
-                                          </p:spTgt>
-                                        </p:tgtEl>
-                                      </p:cBhvr>
-                                    </p:animEffect>
-                                  </p:childTnLst>
-                                </p:cTn>
-                              </p:par>
-                              <p:par>
-                                <p:cTn id="16" presetID="10" presetClass="entr" presetSubtype="0" fill="hold" nodeType="withEffect">
-                                  <p:stCondLst>
-                                    <p:cond delay="0"/>
-                                  </p:stCondLst>
-                                  <p:childTnLst>
-                                    <p:set>
-                                      <p:cBhvr>
-                                        <p:cTn id="17" dur="1" fill="hold">
-                                          <p:stCondLst>
-                                            <p:cond delay="0"/>
-                                          </p:stCondLst>
-                                        </p:cTn>
-                                        <p:tgtEl>
-                                          <p:spTgt spid="3">
-                                            <p:txEl>
-                                              <p:pRg st="5" end="5"/>
-                                            </p:txEl>
-                                          </p:spTgt>
-                                        </p:tgtEl>
-                                        <p:attrNameLst>
-                                          <p:attrName>style.visibility</p:attrName>
-                                        </p:attrNameLst>
-                                      </p:cBhvr>
-                                      <p:to>
-                                        <p:strVal val="visible"/>
-                                      </p:to>
-                                    </p:set>
-                                    <p:animEffect transition="in" filter="fade">
-                                      <p:cBhvr>
-                                        <p:cTn id="18" dur="500"/>
-                                        <p:tgtEl>
-                                          <p:spTgt spid="3">
-                                            <p:txEl>
-                                              <p:pRg st="5" end="5"/>
-                                            </p:txEl>
-                                          </p:spTgt>
-                                        </p:tgtEl>
-                                      </p:cBhvr>
-                                    </p:animEffect>
-                                  </p:childTnLst>
-                                </p:cTn>
-                              </p:par>
-                              <p:par>
-                                <p:cTn id="19" presetID="10" presetClass="entr" presetSubtype="0" fill="hold" nodeType="withEffect">
-                                  <p:stCondLst>
-                                    <p:cond delay="0"/>
-                                  </p:stCondLst>
-                                  <p:childTnLst>
-                                    <p:set>
-                                      <p:cBhvr>
-                                        <p:cTn id="20" dur="1" fill="hold">
-                                          <p:stCondLst>
-                                            <p:cond delay="0"/>
-                                          </p:stCondLst>
-                                        </p:cTn>
-                                        <p:tgtEl>
-                                          <p:spTgt spid="3">
-                                            <p:txEl>
-                                              <p:pRg st="7" end="7"/>
-                                            </p:txEl>
-                                          </p:spTgt>
-                                        </p:tgtEl>
-                                        <p:attrNameLst>
-                                          <p:attrName>style.visibility</p:attrName>
-                                        </p:attrNameLst>
-                                      </p:cBhvr>
-                                      <p:to>
-                                        <p:strVal val="visible"/>
-                                      </p:to>
-                                    </p:set>
-                                    <p:animEffect transition="in" filter="fade">
-                                      <p:cBhvr>
-                                        <p:cTn id="21" dur="500"/>
-                                        <p:tgtEl>
-                                          <p:spTgt spid="3">
-                                            <p:txEl>
-                                              <p:pRg st="7" end="7"/>
-                                            </p:txEl>
-                                          </p:spTgt>
-                                        </p:tgtEl>
-                                      </p:cBhvr>
-                                    </p:animEffect>
-                                  </p:childTnLst>
-                                </p:cTn>
-                              </p:par>
-                              <p:par>
-                                <p:cTn id="22" presetID="10" presetClass="entr" presetSubtype="0" fill="hold" nodeType="withEffect">
-                                  <p:stCondLst>
-                                    <p:cond delay="0"/>
-                                  </p:stCondLst>
-                                  <p:childTnLst>
-                                    <p:set>
-                                      <p:cBhvr>
-                                        <p:cTn id="23" dur="1" fill="hold">
-                                          <p:stCondLst>
-                                            <p:cond delay="0"/>
-                                          </p:stCondLst>
-                                        </p:cTn>
-                                        <p:tgtEl>
-                                          <p:spTgt spid="3">
-                                            <p:txEl>
-                                              <p:pRg st="9" end="9"/>
-                                            </p:txEl>
-                                          </p:spTgt>
-                                        </p:tgtEl>
-                                        <p:attrNameLst>
-                                          <p:attrName>style.visibility</p:attrName>
-                                        </p:attrNameLst>
-                                      </p:cBhvr>
-                                      <p:to>
-                                        <p:strVal val="visible"/>
-                                      </p:to>
-                                    </p:set>
-                                    <p:animEffect transition="in" filter="fade">
-                                      <p:cBhvr>
-                                        <p:cTn id="24" dur="500"/>
-                                        <p:tgtEl>
-                                          <p:spTgt spid="3">
-                                            <p:txEl>
-                                              <p:pRg st="9" end="9"/>
-                                            </p:txEl>
-                                          </p:spTgt>
-                                        </p:tgtEl>
-                                      </p:cBhvr>
-                                    </p:animEffect>
-                                  </p:childTnLst>
-                                </p:cTn>
-                              </p:par>
-                            </p:childTnLst>
-                          </p:cTn>
-                        </p:par>
-                      </p:childTnLst>
-                    </p:cTn>
-                  </p:par>
-                </p:childTnLst>
-              </p:cTn>
-              <p:prevCondLst>
-                <p:cond evt="onPrev" delay="0">
-                  <p:tgtEl>
-                    <p:sldTgt/>
-                  </p:tgtEl>
-                </p:cond>
-              </p:prevCondLst>
-              <p:nextCondLst>
-                <p:cond evt="onNext" delay="0">
-                  <p:tgtEl>
-                    <p:sldTgt/>
-                  </p:tgtEl>
-                </p:cond>
-              </p:nextCondLst>
-            </p:seq>
-          </p:childTnLst>
-        </p:cTn>
-      </p:par>
-    </p:tnLst>
-  </p:timing>
-</p:sld>
-</file>
-
-<file path=ppt/slides/slide17.xml><?xml version="1.0" encoding="utf-8"?>
-<p:sld xmlns:a="http://schemas.openxmlformats.org/drawingml/2006/main" xmlns:r="http://schemas.openxmlformats.org/officeDocument/2006/relationships" xmlns:p="http://schemas.openxmlformats.org/presentationml/2006/main">
-  <p:cSld>
-    <p:spTree>
-      <p:nvGrpSpPr>
-        <p:cNvPr id="1" name=""/>
-        <p:cNvGrpSpPr/>
-        <p:nvPr/>
-      </p:nvGrpSpPr>
-      <p:grpSpPr>
-        <a:xfrm>
-          <a:off x="0" y="0"/>
-          <a:ext cx="0" cy="0"/>
-          <a:chOff x="0" y="0"/>
-          <a:chExt cx="0" cy="0"/>
-        </a:xfrm>
-      </p:grpSpPr>
-      <p:sp>
-        <p:nvSpPr>
-          <p:cNvPr id="2" name="Title 1"/>
-          <p:cNvSpPr>
-            <a:spLocks noGrp="1"/>
-          </p:cNvSpPr>
-          <p:nvPr>
-            <p:ph type="title"/>
-          </p:nvPr>
-        </p:nvSpPr>
-        <p:spPr>
-          <a:xfrm>
-            <a:off x="338666" y="271992"/>
-            <a:ext cx="10515600" cy="1325563"/>
-          </a:xfrm>
-        </p:spPr>
-        <p:txBody>
-          <a:bodyPr>
-            <a:normAutofit/>
-          </a:bodyPr>
-          <a:lstStyle/>
-          <a:p>
-            <a:r>
-              <a:rPr lang="en-GB" dirty="0"/>
-              <a:t>Table Variables &amp; Temporary Tables</a:t>
-            </a:r>
-          </a:p>
-        </p:txBody>
-      </p:sp>
-      <p:sp>
-        <p:nvSpPr>
-          <p:cNvPr id="3" name="Content Placeholder 2"/>
-          <p:cNvSpPr>
-            <a:spLocks noGrp="1"/>
-          </p:cNvSpPr>
-          <p:nvPr>
-            <p:ph idx="1"/>
-          </p:nvPr>
-        </p:nvSpPr>
-        <p:spPr>
-          <a:xfrm>
-            <a:off x="838200" y="1363133"/>
-            <a:ext cx="10515600" cy="4813830"/>
-          </a:xfrm>
-        </p:spPr>
-        <p:txBody>
-          <a:bodyPr>
-            <a:normAutofit/>
-          </a:bodyPr>
-          <a:lstStyle/>
-          <a:p>
-            <a:r>
-              <a:rPr lang="en-GB" dirty="0"/>
-              <a:t>Temporary Tables</a:t>
-            </a:r>
-          </a:p>
-          <a:p>
-            <a:pPr lvl="1"/>
-            <a:r>
-              <a:rPr lang="en-GB" dirty="0"/>
-              <a:t>Used to hold temporary result sets</a:t>
-            </a:r>
-          </a:p>
-          <a:p>
-            <a:pPr lvl="1"/>
-            <a:endParaRPr lang="en-GB" dirty="0"/>
-          </a:p>
-          <a:p>
-            <a:pPr lvl="1"/>
-            <a:r>
-              <a:rPr lang="en-GB" dirty="0"/>
-              <a:t>Statistics maintained</a:t>
-            </a:r>
-          </a:p>
-          <a:p>
-            <a:pPr lvl="1"/>
-            <a:endParaRPr lang="en-GB" dirty="0"/>
-          </a:p>
-          <a:p>
-            <a:pPr lvl="1"/>
-            <a:r>
-              <a:rPr lang="en-GB" dirty="0"/>
-              <a:t>Indexes can be created</a:t>
-            </a:r>
-          </a:p>
-          <a:p>
-            <a:pPr lvl="1"/>
-            <a:endParaRPr lang="en-GB" dirty="0"/>
-          </a:p>
-          <a:p>
-            <a:pPr lvl="1"/>
-            <a:r>
-              <a:rPr lang="en-GB" dirty="0"/>
-              <a:t>Good if you have to handle medium sized or big workloads</a:t>
-            </a:r>
-          </a:p>
-          <a:p>
-            <a:pPr lvl="1"/>
-            <a:endParaRPr lang="en-GB" dirty="0"/>
-          </a:p>
-          <a:p>
-            <a:pPr lvl="1"/>
-            <a:r>
-              <a:rPr lang="en-GB" dirty="0"/>
-              <a:t>Depending the creation, can be accessed outside of the batch scope</a:t>
-            </a:r>
-          </a:p>
-        </p:txBody>
-      </p:sp>
-    </p:spTree>
-    <p:extLst>
-      <p:ext uri="{BB962C8B-B14F-4D97-AF65-F5344CB8AC3E}">
-        <p14:creationId xmlns:p14="http://schemas.microsoft.com/office/powerpoint/2010/main" val="267647900"/>
       </p:ext>
     </p:extLst>
   </p:cSld>
@@ -8188,7 +7806,7 @@
       </p:grpSpPr>
       <p:sp>
         <p:nvSpPr>
-          <p:cNvPr id="4" name="Title 3"/>
+          <p:cNvPr id="2" name="Title 1"/>
           <p:cNvSpPr>
             <a:spLocks noGrp="1"/>
           </p:cNvSpPr>
@@ -8196,7 +7814,12 @@
             <p:ph type="title"/>
           </p:nvPr>
         </p:nvSpPr>
-        <p:spPr/>
+        <p:spPr>
+          <a:xfrm>
+            <a:off x="338666" y="271992"/>
+            <a:ext cx="10515600" cy="1325563"/>
+          </a:xfrm>
+        </p:spPr>
         <p:txBody>
           <a:bodyPr>
             <a:normAutofit/>
@@ -8204,45 +7827,426 @@
           <a:lstStyle/>
           <a:p>
             <a:r>
-              <a:rPr lang="en-GB" dirty="0">
-                <a:solidFill>
-                  <a:schemeClr val="accent1"/>
-                </a:solidFill>
-              </a:rPr>
-              <a:t>Demo</a:t>
-            </a:r>
-          </a:p>
-        </p:txBody>
-      </p:sp>
-      <p:sp>
-        <p:nvSpPr>
-          <p:cNvPr id="2" name="Text Placeholder 1"/>
-          <p:cNvSpPr>
-            <a:spLocks noGrp="1"/>
-          </p:cNvSpPr>
-          <p:nvPr>
-            <p:ph type="body" idx="1"/>
-          </p:nvPr>
-        </p:nvSpPr>
-        <p:spPr/>
-        <p:txBody>
-          <a:bodyPr/>
+              <a:rPr lang="en-GB" dirty="0"/>
+              <a:t>Table Variables &amp; Temporary Tables</a:t>
+            </a:r>
+          </a:p>
+        </p:txBody>
+      </p:sp>
+      <p:sp>
+        <p:nvSpPr>
+          <p:cNvPr id="3" name="Content Placeholder 2"/>
+          <p:cNvSpPr>
+            <a:spLocks noGrp="1"/>
+          </p:cNvSpPr>
+          <p:nvPr>
+            <p:ph idx="1"/>
+          </p:nvPr>
+        </p:nvSpPr>
+        <p:spPr>
+          <a:xfrm>
+            <a:off x="838200" y="1363133"/>
+            <a:ext cx="10515600" cy="4813830"/>
+          </a:xfrm>
+        </p:spPr>
+        <p:txBody>
+          <a:bodyPr>
+            <a:normAutofit/>
+          </a:bodyPr>
           <a:lstStyle/>
           <a:p>
+            <a:r>
+              <a:rPr lang="en-GB" dirty="0"/>
+              <a:t>Temporary Tables</a:t>
+            </a:r>
+          </a:p>
+          <a:p>
+            <a:pPr lvl="1"/>
+            <a:r>
+              <a:rPr lang="en-GB" dirty="0"/>
+              <a:t>Used to hold temporary result sets</a:t>
+            </a:r>
+          </a:p>
+          <a:p>
+            <a:pPr lvl="1"/>
             <a:endParaRPr lang="en-GB" dirty="0"/>
+          </a:p>
+          <a:p>
+            <a:pPr lvl="1"/>
+            <a:r>
+              <a:rPr lang="en-GB" dirty="0"/>
+              <a:t>Statistics maintained</a:t>
+            </a:r>
+          </a:p>
+          <a:p>
+            <a:pPr lvl="1"/>
+            <a:endParaRPr lang="en-GB" dirty="0"/>
+          </a:p>
+          <a:p>
+            <a:pPr lvl="1"/>
+            <a:r>
+              <a:rPr lang="en-GB" dirty="0"/>
+              <a:t>Indexes can be created</a:t>
+            </a:r>
+          </a:p>
+          <a:p>
+            <a:pPr lvl="1"/>
+            <a:endParaRPr lang="en-GB" dirty="0"/>
+          </a:p>
+          <a:p>
+            <a:pPr lvl="1"/>
+            <a:r>
+              <a:rPr lang="en-GB" dirty="0"/>
+              <a:t>Good if you have to handle medium sized or big workloads</a:t>
+            </a:r>
+          </a:p>
+          <a:p>
+            <a:pPr lvl="1"/>
+            <a:endParaRPr lang="en-GB" dirty="0"/>
+          </a:p>
+          <a:p>
+            <a:pPr lvl="1"/>
+            <a:r>
+              <a:rPr lang="en-GB" dirty="0"/>
+              <a:t>Depending the creation, can be accessed outside of the batch scope</a:t>
+            </a:r>
           </a:p>
         </p:txBody>
       </p:sp>
     </p:spTree>
     <p:extLst>
       <p:ext uri="{BB962C8B-B14F-4D97-AF65-F5344CB8AC3E}">
-        <p14:creationId xmlns:p14="http://schemas.microsoft.com/office/powerpoint/2010/main" val="3579626263"/>
+        <p14:creationId xmlns:p14="http://schemas.microsoft.com/office/powerpoint/2010/main" val="267647900"/>
       </p:ext>
     </p:extLst>
   </p:cSld>
   <p:clrMapOvr>
     <a:masterClrMapping/>
   </p:clrMapOvr>
+  <p:timing>
+    <p:tnLst>
+      <p:par>
+        <p:cTn id="1" dur="indefinite" restart="never" nodeType="tmRoot">
+          <p:childTnLst>
+            <p:seq concurrent="1" nextAc="seek">
+              <p:cTn id="2" dur="indefinite" nodeType="mainSeq">
+                <p:childTnLst>
+                  <p:par>
+                    <p:cTn id="3" fill="hold">
+                      <p:stCondLst>
+                        <p:cond delay="indefinite"/>
+                      </p:stCondLst>
+                      <p:childTnLst>
+                        <p:par>
+                          <p:cTn id="4" fill="hold">
+                            <p:stCondLst>
+                              <p:cond delay="0"/>
+                            </p:stCondLst>
+                            <p:childTnLst>
+                              <p:par>
+                                <p:cTn id="5" presetID="10" presetClass="entr" presetSubtype="0" fill="hold" nodeType="clickEffect">
+                                  <p:stCondLst>
+                                    <p:cond delay="0"/>
+                                  </p:stCondLst>
+                                  <p:childTnLst>
+                                    <p:set>
+                                      <p:cBhvr>
+                                        <p:cTn id="6" dur="1" fill="hold">
+                                          <p:stCondLst>
+                                            <p:cond delay="0"/>
+                                          </p:stCondLst>
+                                        </p:cTn>
+                                        <p:tgtEl>
+                                          <p:spTgt spid="3">
+                                            <p:txEl>
+                                              <p:pRg st="0" end="0"/>
+                                            </p:txEl>
+                                          </p:spTgt>
+                                        </p:tgtEl>
+                                        <p:attrNameLst>
+                                          <p:attrName>style.visibility</p:attrName>
+                                        </p:attrNameLst>
+                                      </p:cBhvr>
+                                      <p:to>
+                                        <p:strVal val="visible"/>
+                                      </p:to>
+                                    </p:set>
+                                    <p:animEffect transition="in" filter="fade">
+                                      <p:cBhvr>
+                                        <p:cTn id="7" dur="500"/>
+                                        <p:tgtEl>
+                                          <p:spTgt spid="3">
+                                            <p:txEl>
+                                              <p:pRg st="0" end="0"/>
+                                            </p:txEl>
+                                          </p:spTgt>
+                                        </p:tgtEl>
+                                      </p:cBhvr>
+                                    </p:animEffect>
+                                  </p:childTnLst>
+                                </p:cTn>
+                              </p:par>
+                            </p:childTnLst>
+                          </p:cTn>
+                        </p:par>
+                      </p:childTnLst>
+                    </p:cTn>
+                  </p:par>
+                  <p:par>
+                    <p:cTn id="8" fill="hold">
+                      <p:stCondLst>
+                        <p:cond delay="indefinite"/>
+                      </p:stCondLst>
+                      <p:childTnLst>
+                        <p:par>
+                          <p:cTn id="9" fill="hold">
+                            <p:stCondLst>
+                              <p:cond delay="0"/>
+                            </p:stCondLst>
+                            <p:childTnLst>
+                              <p:par>
+                                <p:cTn id="10" presetID="10" presetClass="entr" presetSubtype="0" fill="hold" nodeType="clickEffect">
+                                  <p:stCondLst>
+                                    <p:cond delay="0"/>
+                                  </p:stCondLst>
+                                  <p:childTnLst>
+                                    <p:set>
+                                      <p:cBhvr>
+                                        <p:cTn id="11" dur="1" fill="hold">
+                                          <p:stCondLst>
+                                            <p:cond delay="0"/>
+                                          </p:stCondLst>
+                                        </p:cTn>
+                                        <p:tgtEl>
+                                          <p:spTgt spid="3">
+                                            <p:txEl>
+                                              <p:pRg st="1" end="1"/>
+                                            </p:txEl>
+                                          </p:spTgt>
+                                        </p:tgtEl>
+                                        <p:attrNameLst>
+                                          <p:attrName>style.visibility</p:attrName>
+                                        </p:attrNameLst>
+                                      </p:cBhvr>
+                                      <p:to>
+                                        <p:strVal val="visible"/>
+                                      </p:to>
+                                    </p:set>
+                                    <p:animEffect transition="in" filter="fade">
+                                      <p:cBhvr>
+                                        <p:cTn id="12" dur="500"/>
+                                        <p:tgtEl>
+                                          <p:spTgt spid="3">
+                                            <p:txEl>
+                                              <p:pRg st="1" end="1"/>
+                                            </p:txEl>
+                                          </p:spTgt>
+                                        </p:tgtEl>
+                                      </p:cBhvr>
+                                    </p:animEffect>
+                                  </p:childTnLst>
+                                </p:cTn>
+                              </p:par>
+                              <p:par>
+                                <p:cTn id="13" presetID="10" presetClass="entr" presetSubtype="0" fill="hold" nodeType="withEffect">
+                                  <p:stCondLst>
+                                    <p:cond delay="0"/>
+                                  </p:stCondLst>
+                                  <p:childTnLst>
+                                    <p:set>
+                                      <p:cBhvr>
+                                        <p:cTn id="14" dur="1" fill="hold">
+                                          <p:stCondLst>
+                                            <p:cond delay="0"/>
+                                          </p:stCondLst>
+                                        </p:cTn>
+                                        <p:tgtEl>
+                                          <p:spTgt spid="3">
+                                            <p:txEl>
+                                              <p:pRg st="3" end="3"/>
+                                            </p:txEl>
+                                          </p:spTgt>
+                                        </p:tgtEl>
+                                        <p:attrNameLst>
+                                          <p:attrName>style.visibility</p:attrName>
+                                        </p:attrNameLst>
+                                      </p:cBhvr>
+                                      <p:to>
+                                        <p:strVal val="visible"/>
+                                      </p:to>
+                                    </p:set>
+                                    <p:animEffect transition="in" filter="fade">
+                                      <p:cBhvr>
+                                        <p:cTn id="15" dur="500"/>
+                                        <p:tgtEl>
+                                          <p:spTgt spid="3">
+                                            <p:txEl>
+                                              <p:pRg st="3" end="3"/>
+                                            </p:txEl>
+                                          </p:spTgt>
+                                        </p:tgtEl>
+                                      </p:cBhvr>
+                                    </p:animEffect>
+                                  </p:childTnLst>
+                                </p:cTn>
+                              </p:par>
+                              <p:par>
+                                <p:cTn id="16" presetID="10" presetClass="entr" presetSubtype="0" fill="hold" nodeType="withEffect">
+                                  <p:stCondLst>
+                                    <p:cond delay="0"/>
+                                  </p:stCondLst>
+                                  <p:childTnLst>
+                                    <p:set>
+                                      <p:cBhvr>
+                                        <p:cTn id="17" dur="1" fill="hold">
+                                          <p:stCondLst>
+                                            <p:cond delay="0"/>
+                                          </p:stCondLst>
+                                        </p:cTn>
+                                        <p:tgtEl>
+                                          <p:spTgt spid="3">
+                                            <p:txEl>
+                                              <p:pRg st="5" end="5"/>
+                                            </p:txEl>
+                                          </p:spTgt>
+                                        </p:tgtEl>
+                                        <p:attrNameLst>
+                                          <p:attrName>style.visibility</p:attrName>
+                                        </p:attrNameLst>
+                                      </p:cBhvr>
+                                      <p:to>
+                                        <p:strVal val="visible"/>
+                                      </p:to>
+                                    </p:set>
+                                    <p:animEffect transition="in" filter="fade">
+                                      <p:cBhvr>
+                                        <p:cTn id="18" dur="500"/>
+                                        <p:tgtEl>
+                                          <p:spTgt spid="3">
+                                            <p:txEl>
+                                              <p:pRg st="5" end="5"/>
+                                            </p:txEl>
+                                          </p:spTgt>
+                                        </p:tgtEl>
+                                      </p:cBhvr>
+                                    </p:animEffect>
+                                  </p:childTnLst>
+                                </p:cTn>
+                              </p:par>
+                              <p:par>
+                                <p:cTn id="19" presetID="10" presetClass="entr" presetSubtype="0" fill="hold" nodeType="withEffect">
+                                  <p:stCondLst>
+                                    <p:cond delay="0"/>
+                                  </p:stCondLst>
+                                  <p:childTnLst>
+                                    <p:set>
+                                      <p:cBhvr>
+                                        <p:cTn id="20" dur="1" fill="hold">
+                                          <p:stCondLst>
+                                            <p:cond delay="0"/>
+                                          </p:stCondLst>
+                                        </p:cTn>
+                                        <p:tgtEl>
+                                          <p:spTgt spid="3">
+                                            <p:txEl>
+                                              <p:pRg st="7" end="7"/>
+                                            </p:txEl>
+                                          </p:spTgt>
+                                        </p:tgtEl>
+                                        <p:attrNameLst>
+                                          <p:attrName>style.visibility</p:attrName>
+                                        </p:attrNameLst>
+                                      </p:cBhvr>
+                                      <p:to>
+                                        <p:strVal val="visible"/>
+                                      </p:to>
+                                    </p:set>
+                                    <p:animEffect transition="in" filter="fade">
+                                      <p:cBhvr>
+                                        <p:cTn id="21" dur="500"/>
+                                        <p:tgtEl>
+                                          <p:spTgt spid="3">
+                                            <p:txEl>
+                                              <p:pRg st="7" end="7"/>
+                                            </p:txEl>
+                                          </p:spTgt>
+                                        </p:tgtEl>
+                                      </p:cBhvr>
+                                    </p:animEffect>
+                                  </p:childTnLst>
+                                </p:cTn>
+                              </p:par>
+                              <p:par>
+                                <p:cTn id="22" presetID="10" presetClass="entr" presetSubtype="0" fill="hold" nodeType="withEffect">
+                                  <p:stCondLst>
+                                    <p:cond delay="0"/>
+                                  </p:stCondLst>
+                                  <p:childTnLst>
+                                    <p:set>
+                                      <p:cBhvr>
+                                        <p:cTn id="23" dur="1" fill="hold">
+                                          <p:stCondLst>
+                                            <p:cond delay="0"/>
+                                          </p:stCondLst>
+                                        </p:cTn>
+                                        <p:tgtEl>
+                                          <p:spTgt spid="3">
+                                            <p:txEl>
+                                              <p:pRg st="9" end="9"/>
+                                            </p:txEl>
+                                          </p:spTgt>
+                                        </p:tgtEl>
+                                        <p:attrNameLst>
+                                          <p:attrName>style.visibility</p:attrName>
+                                        </p:attrNameLst>
+                                      </p:cBhvr>
+                                      <p:to>
+                                        <p:strVal val="visible"/>
+                                      </p:to>
+                                    </p:set>
+                                    <p:animEffect transition="in" filter="fade">
+                                      <p:cBhvr>
+                                        <p:cTn id="24" dur="500"/>
+                                        <p:tgtEl>
+                                          <p:spTgt spid="3">
+                                            <p:txEl>
+                                              <p:pRg st="9" end="9"/>
+                                            </p:txEl>
+                                          </p:spTgt>
+                                        </p:tgtEl>
+                                      </p:cBhvr>
+                                    </p:animEffect>
+                                  </p:childTnLst>
+                                </p:cTn>
+                              </p:par>
+                            </p:childTnLst>
+                          </p:cTn>
+                        </p:par>
+                      </p:childTnLst>
+                    </p:cTn>
+                  </p:par>
+                </p:childTnLst>
+              </p:cTn>
+              <p:prevCondLst>
+                <p:cond evt="onPrev" delay="0">
+                  <p:tgtEl>
+                    <p:sldTgt/>
+                  </p:tgtEl>
+                </p:cond>
+              </p:prevCondLst>
+              <p:nextCondLst>
+                <p:cond evt="onNext" delay="0">
+                  <p:tgtEl>
+                    <p:sldTgt/>
+                  </p:tgtEl>
+                </p:cond>
+              </p:nextCondLst>
+            </p:seq>
+          </p:childTnLst>
+        </p:cTn>
+      </p:par>
+    </p:tnLst>
+  </p:timing>
 </p:sld>
 </file>
 
@@ -8265,7 +8269,7 @@
       </p:grpSpPr>
       <p:sp>
         <p:nvSpPr>
-          <p:cNvPr id="2" name="Title 1"/>
+          <p:cNvPr id="4" name="Title 3"/>
           <p:cNvSpPr>
             <a:spLocks noGrp="1"/>
           </p:cNvSpPr>
@@ -8273,12 +8277,7 @@
             <p:ph type="title"/>
           </p:nvPr>
         </p:nvSpPr>
-        <p:spPr>
-          <a:xfrm>
-            <a:off x="338666" y="271992"/>
-            <a:ext cx="10515600" cy="1325563"/>
-          </a:xfrm>
-        </p:spPr>
+        <p:spPr/>
         <p:txBody>
           <a:bodyPr>
             <a:normAutofit/>
@@ -8286,66 +8285,30 @@
           <a:lstStyle/>
           <a:p>
             <a:r>
-              <a:rPr lang="en-GB" dirty="0"/>
-              <a:t>Maintaining Indexes</a:t>
-            </a:r>
-          </a:p>
-        </p:txBody>
-      </p:sp>
-      <p:sp>
-        <p:nvSpPr>
-          <p:cNvPr id="3" name="Content Placeholder 2"/>
-          <p:cNvSpPr>
-            <a:spLocks noGrp="1"/>
-          </p:cNvSpPr>
-          <p:nvPr>
-            <p:ph idx="1"/>
-          </p:nvPr>
-        </p:nvSpPr>
-        <p:spPr>
-          <a:xfrm>
-            <a:off x="838200" y="1363133"/>
-            <a:ext cx="10515600" cy="4813830"/>
-          </a:xfrm>
-        </p:spPr>
-        <p:txBody>
-          <a:bodyPr>
-            <a:normAutofit/>
-          </a:bodyPr>
+              <a:rPr lang="en-GB" dirty="0">
+                <a:solidFill>
+                  <a:schemeClr val="accent1"/>
+                </a:solidFill>
+              </a:rPr>
+              <a:t>Demo</a:t>
+            </a:r>
+          </a:p>
+        </p:txBody>
+      </p:sp>
+      <p:sp>
+        <p:nvSpPr>
+          <p:cNvPr id="2" name="Text Placeholder 1"/>
+          <p:cNvSpPr>
+            <a:spLocks noGrp="1"/>
+          </p:cNvSpPr>
+          <p:nvPr>
+            <p:ph type="body" idx="1"/>
+          </p:nvPr>
+        </p:nvSpPr>
+        <p:spPr/>
+        <p:txBody>
+          <a:bodyPr/>
           <a:lstStyle/>
-          <a:p>
-            <a:r>
-              <a:rPr lang="en-GB" dirty="0"/>
-              <a:t>How do I know if they are being used?</a:t>
-            </a:r>
-          </a:p>
-          <a:p>
-            <a:endParaRPr lang="en-GB" dirty="0"/>
-          </a:p>
-          <a:p>
-            <a:r>
-              <a:rPr lang="en-GB" dirty="0"/>
-              <a:t>Do I have too many indexes in my Database?</a:t>
-            </a:r>
-          </a:p>
-          <a:p>
-            <a:endParaRPr lang="en-GB" dirty="0"/>
-          </a:p>
-          <a:p>
-            <a:r>
-              <a:rPr lang="en-GB" dirty="0"/>
-              <a:t>Remember. Indexes are hard to maintain</a:t>
-            </a:r>
-          </a:p>
-          <a:p>
-            <a:endParaRPr lang="en-GB" dirty="0"/>
-          </a:p>
-          <a:p>
-            <a:r>
-              <a:rPr lang="en-GB" dirty="0"/>
-              <a:t>What about missing indexes?</a:t>
-            </a:r>
-          </a:p>
           <a:p>
             <a:endParaRPr lang="en-GB" dirty="0"/>
           </a:p>
@@ -8354,7 +8317,7 @@
     </p:spTree>
     <p:extLst>
       <p:ext uri="{BB962C8B-B14F-4D97-AF65-F5344CB8AC3E}">
-        <p14:creationId xmlns:p14="http://schemas.microsoft.com/office/powerpoint/2010/main" val="895120504"/>
+        <p14:creationId xmlns:p14="http://schemas.microsoft.com/office/powerpoint/2010/main" val="3579626263"/>
       </p:ext>
     </p:extLst>
   </p:cSld>
@@ -8437,6 +8400,124 @@
       </p:grpSpPr>
       <p:sp>
         <p:nvSpPr>
+          <p:cNvPr id="2" name="Title 1"/>
+          <p:cNvSpPr>
+            <a:spLocks noGrp="1"/>
+          </p:cNvSpPr>
+          <p:nvPr>
+            <p:ph type="title"/>
+          </p:nvPr>
+        </p:nvSpPr>
+        <p:spPr>
+          <a:xfrm>
+            <a:off x="338666" y="271992"/>
+            <a:ext cx="10515600" cy="1325563"/>
+          </a:xfrm>
+        </p:spPr>
+        <p:txBody>
+          <a:bodyPr>
+            <a:normAutofit/>
+          </a:bodyPr>
+          <a:lstStyle/>
+          <a:p>
+            <a:r>
+              <a:rPr lang="en-GB" dirty="0"/>
+              <a:t>Maintaining Indexes</a:t>
+            </a:r>
+          </a:p>
+        </p:txBody>
+      </p:sp>
+      <p:sp>
+        <p:nvSpPr>
+          <p:cNvPr id="3" name="Content Placeholder 2"/>
+          <p:cNvSpPr>
+            <a:spLocks noGrp="1"/>
+          </p:cNvSpPr>
+          <p:nvPr>
+            <p:ph idx="1"/>
+          </p:nvPr>
+        </p:nvSpPr>
+        <p:spPr>
+          <a:xfrm>
+            <a:off x="838200" y="1363133"/>
+            <a:ext cx="10515600" cy="4813830"/>
+          </a:xfrm>
+        </p:spPr>
+        <p:txBody>
+          <a:bodyPr>
+            <a:normAutofit/>
+          </a:bodyPr>
+          <a:lstStyle/>
+          <a:p>
+            <a:r>
+              <a:rPr lang="en-GB" dirty="0"/>
+              <a:t>How do I know if they are being used?</a:t>
+            </a:r>
+          </a:p>
+          <a:p>
+            <a:endParaRPr lang="en-GB" dirty="0"/>
+          </a:p>
+          <a:p>
+            <a:r>
+              <a:rPr lang="en-GB" dirty="0"/>
+              <a:t>Do I have too many indexes in my Database?</a:t>
+            </a:r>
+          </a:p>
+          <a:p>
+            <a:endParaRPr lang="en-GB" dirty="0"/>
+          </a:p>
+          <a:p>
+            <a:r>
+              <a:rPr lang="en-GB" dirty="0"/>
+              <a:t>Remember. Indexes are hard to maintain</a:t>
+            </a:r>
+          </a:p>
+          <a:p>
+            <a:endParaRPr lang="en-GB" dirty="0"/>
+          </a:p>
+          <a:p>
+            <a:r>
+              <a:rPr lang="en-GB" dirty="0"/>
+              <a:t>What about missing indexes?</a:t>
+            </a:r>
+          </a:p>
+          <a:p>
+            <a:endParaRPr lang="en-GB" dirty="0"/>
+          </a:p>
+        </p:txBody>
+      </p:sp>
+    </p:spTree>
+    <p:extLst>
+      <p:ext uri="{BB962C8B-B14F-4D97-AF65-F5344CB8AC3E}">
+        <p14:creationId xmlns:p14="http://schemas.microsoft.com/office/powerpoint/2010/main" val="895120504"/>
+      </p:ext>
+    </p:extLst>
+  </p:cSld>
+  <p:clrMapOvr>
+    <a:masterClrMapping/>
+  </p:clrMapOvr>
+</p:sld>
+</file>
+
+<file path=ppt/slides/slide21.xml><?xml version="1.0" encoding="utf-8"?>
+<p:sld xmlns:a="http://schemas.openxmlformats.org/drawingml/2006/main" xmlns:r="http://schemas.openxmlformats.org/officeDocument/2006/relationships" xmlns:p="http://schemas.openxmlformats.org/presentationml/2006/main">
+  <p:cSld>
+    <p:spTree>
+      <p:nvGrpSpPr>
+        <p:cNvPr id="1" name=""/>
+        <p:cNvGrpSpPr/>
+        <p:nvPr/>
+      </p:nvGrpSpPr>
+      <p:grpSpPr>
+        <a:xfrm>
+          <a:off x="0" y="0"/>
+          <a:ext cx="0" cy="0"/>
+          <a:chOff x="0" y="0"/>
+          <a:chExt cx="0" cy="0"/>
+        </a:xfrm>
+      </p:grpSpPr>
+      <p:sp>
+        <p:nvSpPr>
           <p:cNvPr id="4" name="Title 3"/>
           <p:cNvSpPr>
             <a:spLocks noGrp="1"/>
@@ -8495,7 +8576,7 @@
 </p:sld>
 </file>
 
-<file path=ppt/slides/slide21.xml><?xml version="1.0" encoding="utf-8"?>
+<file path=ppt/slides/slide22.xml><?xml version="1.0" encoding="utf-8"?>
 <p:sld xmlns:a="http://schemas.openxmlformats.org/drawingml/2006/main" xmlns:r="http://schemas.openxmlformats.org/officeDocument/2006/relationships" xmlns:p="http://schemas.openxmlformats.org/presentationml/2006/main">
   <p:cSld>
     <p:spTree>
@@ -8871,83 +8952,6 @@
 </p:sld>
 </file>
 
-<file path=ppt/slides/slide22.xml><?xml version="1.0" encoding="utf-8"?>
-<p:sld xmlns:a="http://schemas.openxmlformats.org/drawingml/2006/main" xmlns:r="http://schemas.openxmlformats.org/officeDocument/2006/relationships" xmlns:p="http://schemas.openxmlformats.org/presentationml/2006/main">
-  <p:cSld>
-    <p:spTree>
-      <p:nvGrpSpPr>
-        <p:cNvPr id="1" name=""/>
-        <p:cNvGrpSpPr/>
-        <p:nvPr/>
-      </p:nvGrpSpPr>
-      <p:grpSpPr>
-        <a:xfrm>
-          <a:off x="0" y="0"/>
-          <a:ext cx="0" cy="0"/>
-          <a:chOff x="0" y="0"/>
-          <a:chExt cx="0" cy="0"/>
-        </a:xfrm>
-      </p:grpSpPr>
-      <p:sp>
-        <p:nvSpPr>
-          <p:cNvPr id="4" name="Title 3"/>
-          <p:cNvSpPr>
-            <a:spLocks noGrp="1"/>
-          </p:cNvSpPr>
-          <p:nvPr>
-            <p:ph type="title"/>
-          </p:nvPr>
-        </p:nvSpPr>
-        <p:spPr/>
-        <p:txBody>
-          <a:bodyPr>
-            <a:normAutofit/>
-          </a:bodyPr>
-          <a:lstStyle/>
-          <a:p>
-            <a:r>
-              <a:rPr lang="en-GB" dirty="0">
-                <a:solidFill>
-                  <a:schemeClr val="accent1"/>
-                </a:solidFill>
-              </a:rPr>
-              <a:t>Demo</a:t>
-            </a:r>
-          </a:p>
-        </p:txBody>
-      </p:sp>
-      <p:sp>
-        <p:nvSpPr>
-          <p:cNvPr id="2" name="Text Placeholder 1"/>
-          <p:cNvSpPr>
-            <a:spLocks noGrp="1"/>
-          </p:cNvSpPr>
-          <p:nvPr>
-            <p:ph type="body" idx="1"/>
-          </p:nvPr>
-        </p:nvSpPr>
-        <p:spPr/>
-        <p:txBody>
-          <a:bodyPr/>
-          <a:lstStyle/>
-          <a:p>
-            <a:endParaRPr lang="en-GB" dirty="0"/>
-          </a:p>
-        </p:txBody>
-      </p:sp>
-    </p:spTree>
-    <p:extLst>
-      <p:ext uri="{BB962C8B-B14F-4D97-AF65-F5344CB8AC3E}">
-        <p14:creationId xmlns:p14="http://schemas.microsoft.com/office/powerpoint/2010/main" val="252968371"/>
-      </p:ext>
-    </p:extLst>
-  </p:cSld>
-  <p:clrMapOvr>
-    <a:masterClrMapping/>
-  </p:clrMapOvr>
-</p:sld>
-</file>
-
 <file path=ppt/slides/slide23.xml><?xml version="1.0" encoding="utf-8"?>
 <p:sld xmlns:a="http://schemas.openxmlformats.org/drawingml/2006/main" xmlns:r="http://schemas.openxmlformats.org/officeDocument/2006/relationships" xmlns:p="http://schemas.openxmlformats.org/presentationml/2006/main">
   <p:cSld>
@@ -8967,6 +8971,83 @@
       </p:grpSpPr>
       <p:sp>
         <p:nvSpPr>
+          <p:cNvPr id="4" name="Title 3"/>
+          <p:cNvSpPr>
+            <a:spLocks noGrp="1"/>
+          </p:cNvSpPr>
+          <p:nvPr>
+            <p:ph type="title"/>
+          </p:nvPr>
+        </p:nvSpPr>
+        <p:spPr/>
+        <p:txBody>
+          <a:bodyPr>
+            <a:normAutofit/>
+          </a:bodyPr>
+          <a:lstStyle/>
+          <a:p>
+            <a:r>
+              <a:rPr lang="en-GB" dirty="0">
+                <a:solidFill>
+                  <a:schemeClr val="accent1"/>
+                </a:solidFill>
+              </a:rPr>
+              <a:t>Demo</a:t>
+            </a:r>
+          </a:p>
+        </p:txBody>
+      </p:sp>
+      <p:sp>
+        <p:nvSpPr>
+          <p:cNvPr id="2" name="Text Placeholder 1"/>
+          <p:cNvSpPr>
+            <a:spLocks noGrp="1"/>
+          </p:cNvSpPr>
+          <p:nvPr>
+            <p:ph type="body" idx="1"/>
+          </p:nvPr>
+        </p:nvSpPr>
+        <p:spPr/>
+        <p:txBody>
+          <a:bodyPr/>
+          <a:lstStyle/>
+          <a:p>
+            <a:endParaRPr lang="en-GB" dirty="0"/>
+          </a:p>
+        </p:txBody>
+      </p:sp>
+    </p:spTree>
+    <p:extLst>
+      <p:ext uri="{BB962C8B-B14F-4D97-AF65-F5344CB8AC3E}">
+        <p14:creationId xmlns:p14="http://schemas.microsoft.com/office/powerpoint/2010/main" val="252968371"/>
+      </p:ext>
+    </p:extLst>
+  </p:cSld>
+  <p:clrMapOvr>
+    <a:masterClrMapping/>
+  </p:clrMapOvr>
+</p:sld>
+</file>
+
+<file path=ppt/slides/slide24.xml><?xml version="1.0" encoding="utf-8"?>
+<p:sld xmlns:a="http://schemas.openxmlformats.org/drawingml/2006/main" xmlns:r="http://schemas.openxmlformats.org/officeDocument/2006/relationships" xmlns:p="http://schemas.openxmlformats.org/presentationml/2006/main">
+  <p:cSld>
+    <p:spTree>
+      <p:nvGrpSpPr>
+        <p:cNvPr id="1" name=""/>
+        <p:cNvGrpSpPr/>
+        <p:nvPr/>
+      </p:nvGrpSpPr>
+      <p:grpSpPr>
+        <a:xfrm>
+          <a:off x="0" y="0"/>
+          <a:ext cx="0" cy="0"/>
+          <a:chOff x="0" y="0"/>
+          <a:chExt cx="0" cy="0"/>
+        </a:xfrm>
+      </p:grpSpPr>
+      <p:sp>
+        <p:nvSpPr>
           <p:cNvPr id="2" name="Title 1"/>
           <p:cNvSpPr>
             <a:spLocks noGrp="1"/>
@@ -9100,7 +9181,7 @@
 </p:sld>
 </file>
 
-<file path=ppt/slides/slide24.xml><?xml version="1.0" encoding="utf-8"?>
+<file path=ppt/slides/slide25.xml><?xml version="1.0" encoding="utf-8"?>
 <p:sld xmlns:a="http://schemas.openxmlformats.org/drawingml/2006/main" xmlns:r="http://schemas.openxmlformats.org/officeDocument/2006/relationships" xmlns:p="http://schemas.openxmlformats.org/presentationml/2006/main">
   <p:cSld>
     <p:spTree>
@@ -9979,7 +10060,6 @@
               <a:rPr lang="en-GB" sz="2400" dirty="0"/>
               <a:t>Designing matters &amp; Designing Good Indexes</a:t>
             </a:r>
-            <a:endParaRPr lang="en-GB" sz="2400" dirty="0"/>
           </a:p>
           <a:p>
             <a:pPr marL="0" indent="0">
@@ -10372,6 +10452,168 @@
 </file>
 
 <file path=ppt/slides/slide8.xml><?xml version="1.0" encoding="utf-8"?>
+<p:sld xmlns:a="http://schemas.openxmlformats.org/drawingml/2006/main" xmlns:r="http://schemas.openxmlformats.org/officeDocument/2006/relationships" xmlns:p="http://schemas.openxmlformats.org/presentationml/2006/main" showMasterSp="0">
+  <p:cSld>
+    <p:spTree>
+      <p:nvGrpSpPr>
+        <p:cNvPr id="1" name=""/>
+        <p:cNvGrpSpPr/>
+        <p:nvPr/>
+      </p:nvGrpSpPr>
+      <p:grpSpPr>
+        <a:xfrm>
+          <a:off x="0" y="0"/>
+          <a:ext cx="0" cy="0"/>
+          <a:chOff x="0" y="0"/>
+          <a:chExt cx="0" cy="0"/>
+        </a:xfrm>
+      </p:grpSpPr>
+      <p:sp>
+        <p:nvSpPr>
+          <p:cNvPr id="2" name="Title 1"/>
+          <p:cNvSpPr>
+            <a:spLocks noGrp="1"/>
+          </p:cNvSpPr>
+          <p:nvPr>
+            <p:ph type="title"/>
+          </p:nvPr>
+        </p:nvSpPr>
+        <p:spPr>
+          <a:xfrm>
+            <a:off x="338666" y="271992"/>
+            <a:ext cx="10515600" cy="1325563"/>
+          </a:xfrm>
+        </p:spPr>
+        <p:txBody>
+          <a:bodyPr>
+            <a:normAutofit/>
+          </a:bodyPr>
+          <a:lstStyle/>
+          <a:p>
+            <a:r>
+              <a:rPr lang="en-GB" dirty="0">
+                <a:solidFill>
+                  <a:schemeClr val="accent1"/>
+                </a:solidFill>
+              </a:rPr>
+              <a:t>SQL Server 2016 SP1</a:t>
+            </a:r>
+          </a:p>
+        </p:txBody>
+      </p:sp>
+      <p:pic>
+        <p:nvPicPr>
+          <p:cNvPr id="5122" name="Picture 2" descr="https://msdnshared.blob.core.windows.net/media/2016/11/CPSA.jpg"/>
+          <p:cNvPicPr>
+            <a:picLocks noChangeAspect="1" noChangeArrowheads="1"/>
+          </p:cNvPicPr>
+          <p:nvPr/>
+        </p:nvPicPr>
+        <p:blipFill>
+          <a:blip r:embed="rId2">
+            <a:extLst>
+              <a:ext uri="{28A0092B-C50C-407E-A947-70E740481C1C}">
+                <a14:useLocalDpi xmlns:a14="http://schemas.microsoft.com/office/drawing/2010/main" val="0"/>
+              </a:ext>
+            </a:extLst>
+          </a:blip>
+          <a:srcRect/>
+          <a:stretch>
+            <a:fillRect/>
+          </a:stretch>
+        </p:blipFill>
+        <p:spPr bwMode="auto">
+          <a:xfrm>
+            <a:off x="757044" y="1312409"/>
+            <a:ext cx="10696575" cy="3971925"/>
+          </a:xfrm>
+          <a:prstGeom prst="rect">
+            <a:avLst/>
+          </a:prstGeom>
+          <a:noFill/>
+          <a:extLst>
+            <a:ext uri="{909E8E84-426E-40DD-AFC4-6F175D3DCCD1}">
+              <a14:hiddenFill xmlns:a14="http://schemas.microsoft.com/office/drawing/2010/main">
+                <a:solidFill>
+                  <a:srgbClr val="FFFFFF"/>
+                </a:solidFill>
+              </a14:hiddenFill>
+            </a:ext>
+          </a:extLst>
+        </p:spPr>
+      </p:pic>
+      <p:sp>
+        <p:nvSpPr>
+          <p:cNvPr id="5" name="Rectangle 4"/>
+          <p:cNvSpPr/>
+          <p:nvPr/>
+        </p:nvSpPr>
+        <p:spPr>
+          <a:xfrm>
+            <a:off x="757043" y="5429157"/>
+            <a:ext cx="10696575" cy="1200329"/>
+          </a:xfrm>
+          <a:prstGeom prst="rect">
+            <a:avLst/>
+          </a:prstGeom>
+        </p:spPr>
+        <p:txBody>
+          <a:bodyPr wrap="square">
+            <a:spAutoFit/>
+          </a:bodyPr>
+          <a:lstStyle/>
+          <a:p>
+            <a:pPr marL="285750" indent="-285750">
+              <a:buFont typeface="Arial" panose="020B0604020202020204" pitchFamily="34" charset="0"/>
+              <a:buChar char="•"/>
+            </a:pPr>
+            <a:r>
+              <a:rPr lang="en-US" dirty="0">
+                <a:hlinkClick r:id="rId3"/>
+              </a:rPr>
+              <a:t>https://blogs.msdn.microsoft.com/sqlreleaseservices/sql-server-2016-service-pack-1-sp1-released/</a:t>
+            </a:r>
+            <a:endParaRPr lang="en-US" dirty="0"/>
+          </a:p>
+          <a:p>
+            <a:endParaRPr lang="en-US" dirty="0"/>
+          </a:p>
+          <a:p>
+            <a:pPr marL="285750" indent="-285750">
+              <a:buFont typeface="Arial" panose="020B0604020202020204" pitchFamily="34" charset="0"/>
+              <a:buChar char="•"/>
+            </a:pPr>
+            <a:r>
+              <a:rPr lang="en-US" dirty="0">
+                <a:hlinkClick r:id="rId4"/>
+              </a:rPr>
+              <a:t>https://docs.microsoft.com/en-us/sql/sql-server/editions-and-components-of-sql-server-2016</a:t>
+            </a:r>
+            <a:endParaRPr lang="en-US" dirty="0"/>
+          </a:p>
+          <a:p>
+            <a:pPr marL="285750" indent="-285750">
+              <a:buFont typeface="Arial" panose="020B0604020202020204" pitchFamily="34" charset="0"/>
+              <a:buChar char="•"/>
+            </a:pPr>
+            <a:endParaRPr lang="en-US" dirty="0"/>
+          </a:p>
+        </p:txBody>
+      </p:sp>
+    </p:spTree>
+    <p:extLst>
+      <p:ext uri="{BB962C8B-B14F-4D97-AF65-F5344CB8AC3E}">
+        <p14:creationId xmlns:p14="http://schemas.microsoft.com/office/powerpoint/2010/main" val="36908924"/>
+      </p:ext>
+    </p:extLst>
+  </p:cSld>
+  <p:clrMapOvr>
+    <a:masterClrMapping/>
+  </p:clrMapOvr>
+</p:sld>
+</file>
+
+<file path=ppt/slides/slide9.xml><?xml version="1.0" encoding="utf-8"?>
 <p:sld xmlns:a="http://schemas.openxmlformats.org/drawingml/2006/main" xmlns:r="http://schemas.openxmlformats.org/officeDocument/2006/relationships" xmlns:p="http://schemas.openxmlformats.org/presentationml/2006/main" showMasterSp="0">
   <p:cSld>
     <p:spTree>
@@ -10719,83 +10961,6 @@
       </p:par>
     </p:tnLst>
   </p:timing>
-</p:sld>
-</file>
-
-<file path=ppt/slides/slide9.xml><?xml version="1.0" encoding="utf-8"?>
-<p:sld xmlns:a="http://schemas.openxmlformats.org/drawingml/2006/main" xmlns:r="http://schemas.openxmlformats.org/officeDocument/2006/relationships" xmlns:p="http://schemas.openxmlformats.org/presentationml/2006/main">
-  <p:cSld>
-    <p:spTree>
-      <p:nvGrpSpPr>
-        <p:cNvPr id="1" name=""/>
-        <p:cNvGrpSpPr/>
-        <p:nvPr/>
-      </p:nvGrpSpPr>
-      <p:grpSpPr>
-        <a:xfrm>
-          <a:off x="0" y="0"/>
-          <a:ext cx="0" cy="0"/>
-          <a:chOff x="0" y="0"/>
-          <a:chExt cx="0" cy="0"/>
-        </a:xfrm>
-      </p:grpSpPr>
-      <p:sp>
-        <p:nvSpPr>
-          <p:cNvPr id="4" name="Title 3"/>
-          <p:cNvSpPr>
-            <a:spLocks noGrp="1"/>
-          </p:cNvSpPr>
-          <p:nvPr>
-            <p:ph type="title"/>
-          </p:nvPr>
-        </p:nvSpPr>
-        <p:spPr/>
-        <p:txBody>
-          <a:bodyPr>
-            <a:normAutofit/>
-          </a:bodyPr>
-          <a:lstStyle/>
-          <a:p>
-            <a:r>
-              <a:rPr lang="en-GB" dirty="0">
-                <a:solidFill>
-                  <a:schemeClr val="accent1"/>
-                </a:solidFill>
-              </a:rPr>
-              <a:t>Demo</a:t>
-            </a:r>
-          </a:p>
-        </p:txBody>
-      </p:sp>
-      <p:sp>
-        <p:nvSpPr>
-          <p:cNvPr id="2" name="Text Placeholder 1"/>
-          <p:cNvSpPr>
-            <a:spLocks noGrp="1"/>
-          </p:cNvSpPr>
-          <p:nvPr>
-            <p:ph type="body" idx="1"/>
-          </p:nvPr>
-        </p:nvSpPr>
-        <p:spPr/>
-        <p:txBody>
-          <a:bodyPr/>
-          <a:lstStyle/>
-          <a:p>
-            <a:endParaRPr lang="en-GB" dirty="0"/>
-          </a:p>
-        </p:txBody>
-      </p:sp>
-    </p:spTree>
-    <p:extLst>
-      <p:ext uri="{BB962C8B-B14F-4D97-AF65-F5344CB8AC3E}">
-        <p14:creationId xmlns:p14="http://schemas.microsoft.com/office/powerpoint/2010/main" val="1872281719"/>
-      </p:ext>
-    </p:extLst>
-  </p:cSld>
-  <p:clrMapOvr>
-    <a:masterClrMapping/>
-  </p:clrMapOvr>
 </p:sld>
 </file>
 

</xml_diff>